<commit_message>
KNN and SVM are added, just need RF plot
</commit_message>
<xml_diff>
--- a/C-T-SML Project Poster.pptx
+++ b/C-T-SML Project Poster.pptx
@@ -321,7 +321,7 @@
             <a:fld id="{1E44E51C-57D0-6B4C-9C03-A3E12CE0FF75}" type="datetime1">
               <a:rPr lang="en-US" altLang="en-US"/>
               <a:pPr/>
-              <a:t>4/26/23</a:t>
+              <a:t>4/27/23</a:t>
             </a:fld>
             <a:endParaRPr lang="en-US" altLang="en-US"/>
           </a:p>
@@ -5012,7 +5012,7 @@
                     <a:latin typeface="Calibri" panose="020F0502020204030204" pitchFamily="34" charset="0"/>
                     <a:cs typeface="Calibri" panose="020F0502020204030204" pitchFamily="34" charset="0"/>
                   </a:rPr>
-                  <a:t>What factors affect a vehicle’s real-world carbon dioxide emissions? Can we classify the type of vehicle based on its emissions, fuel efficiency, engine characteristics, and other factors? </a:t>
+                  <a:t>What factors affect a vehicle’s real-world carbon dioxide emissions? Can we classify level of emissions based on vehicle type, fuel efficiency, engine characteristics, and other factors? </a:t>
                 </a:r>
               </a:p>
               <a:p>
@@ -5265,7 +5265,7 @@
                     <a:latin typeface="Calibri" panose="020F0502020204030204" pitchFamily="34" charset="0"/>
                     <a:cs typeface="Calibri" panose="020F0502020204030204" pitchFamily="34" charset="0"/>
                   </a:rPr>
-                  <a:t>For classification to predict emission levels and vehicle type, we tested KNN and Support Vector Machine.</a:t>
+                  <a:t>For classification to predict emission levels, we tested KNN,  Support Vector Machine, and Random Forest. </a:t>
                 </a:r>
               </a:p>
               <a:p>
@@ -5512,14 +5512,14 @@
               </a:ln>
               <a:extLst>
                 <a:ext uri="{909E8E84-426E-40dd-AFC4-6F175D3DCCD1}">
-                  <a14:hiddenFill xmlns="" xmlns:a14="http://schemas.microsoft.com/office/drawing/2010/main">
+                  <a14:hiddenFill xmlns:a14="http://schemas.microsoft.com/office/drawing/2010/main" xmlns="">
                     <a:solidFill>
                       <a:srgbClr val="FFFFFF"/>
                     </a:solidFill>
                   </a14:hiddenFill>
                 </a:ext>
                 <a:ext uri="{91240B29-F687-4f45-9708-019B960494DF}">
-                  <a14:hiddenLine xmlns="" xmlns:a14="http://schemas.microsoft.com/office/drawing/2010/main" w="9525">
+                  <a14:hiddenLine xmlns:a14="http://schemas.microsoft.com/office/drawing/2010/main" xmlns="" w="9525">
                     <a:solidFill>
                       <a:srgbClr val="000000"/>
                     </a:solidFill>
@@ -5553,7 +5553,7 @@
                     <a:ea typeface="ＭＳ Ｐゴシック" charset="0"/>
                     <a:cs typeface="Calibri" panose="020F0502020204030204" pitchFamily="34" charset="0"/>
                   </a:rPr>
-                  <a:t>Predicting Automobile Emissions, Vehicle Type, and Regulatory Class with Machine Learning</a:t>
+                  <a:t>Predicting Automobile Emission Levels and Regulatory Class with Machine Learning</a:t>
                 </a:r>
               </a:p>
             </p:txBody>
@@ -6789,14 +6789,14 @@
           <p:nvPr>
             <p:extLst>
               <p:ext uri="{D42A27DB-BD31-4B8C-83A1-F6EECF244321}">
-                <p14:modId xmlns:p14="http://schemas.microsoft.com/office/powerpoint/2010/main" val="1407248206"/>
+                <p14:modId xmlns:p14="http://schemas.microsoft.com/office/powerpoint/2010/main" val="3547712150"/>
               </p:ext>
             </p:extLst>
           </p:nvPr>
         </p:nvGraphicFramePr>
         <p:xfrm>
           <a:off x="8961120" y="786531"/>
-          <a:ext cx="15110460" cy="21008927"/>
+          <a:ext cx="15110460" cy="20018375"/>
         </p:xfrm>
         <a:graphic>
           <a:graphicData uri="http://schemas.openxmlformats.org/drawingml/2006/table">
@@ -6820,7 +6820,7 @@
                   </a:extLst>
                 </a:gridCol>
               </a:tblGrid>
-              <a:tr h="2836385">
+              <a:tr h="5217062">
                 <a:tc>
                   <a:txBody>
                     <a:bodyPr/>
@@ -6853,6 +6853,26 @@
                     <a:bodyPr/>
                     <a:lstStyle/>
                     <a:p>
+                      <a:pPr algn="ctr"/>
+                      <a:r>
+                        <a:rPr lang="en-US" sz="4000" dirty="0">
+                          <a:latin typeface="Calibri" panose="020F0502020204030204" pitchFamily="34" charset="0"/>
+                          <a:cs typeface="Calibri" panose="020F0502020204030204" pitchFamily="34" charset="0"/>
+                        </a:rPr>
+                        <a:t>Support Vector Machine</a:t>
+                      </a:r>
+                    </a:p>
+                    <a:p>
+                      <a:pPr algn="ctr"/>
+                      <a:r>
+                        <a:rPr lang="en-US" sz="3200" dirty="0">
+                          <a:latin typeface="Calibri" panose="020F0502020204030204" pitchFamily="34" charset="0"/>
+                          <a:cs typeface="Calibri" panose="020F0502020204030204" pitchFamily="34" charset="0"/>
+                        </a:rPr>
+                        <a:t>Linear, Classification Error: 3.78%</a:t>
+                      </a:r>
+                    </a:p>
+                    <a:p>
                       <a:endParaRPr lang="en-US" dirty="0"/>
                     </a:p>
                   </a:txBody>
@@ -6866,7 +6886,7 @@
                   </a:ext>
                 </a:extLst>
               </a:tr>
-              <a:tr h="6102975">
+              <a:tr h="5931711">
                 <a:tc>
                   <a:txBody>
                     <a:bodyPr/>
@@ -6884,14 +6904,40 @@
                         </a:rPr>
                         <a:t>KNN</a:t>
                       </a:r>
-                      <a:endParaRPr lang="en-US" sz="4000" b="0" dirty="0">
-                        <a:solidFill>
-                          <a:schemeClr val="bg1"/>
-                        </a:solidFill>
-                        <a:latin typeface="Calibri" panose="020F0502020204030204" pitchFamily="34" charset="0"/>
-                        <a:ea typeface="Calibri" panose="020F0502020204030204" pitchFamily="34" charset="0"/>
-                        <a:cs typeface="Calibri" panose="020F0502020204030204" pitchFamily="34" charset="0"/>
-                      </a:endParaRPr>
+                    </a:p>
+                    <a:p>
+                      <a:pPr marL="571500" indent="-571500" algn="l">
+                        <a:buFont typeface="Arial" panose="020B0604020202020204" pitchFamily="34" charset="0"/>
+                        <a:buChar char="•"/>
+                      </a:pPr>
+                      <a:r>
+                        <a:rPr lang="en-US" sz="3200" b="1" dirty="0">
+                          <a:solidFill>
+                            <a:schemeClr val="bg1"/>
+                          </a:solidFill>
+                          <a:latin typeface="Calibri" panose="020F0502020204030204" pitchFamily="34" charset="0"/>
+                          <a:ea typeface="Calibri" panose="020F0502020204030204" pitchFamily="34" charset="0"/>
+                          <a:cs typeface="Calibri" panose="020F0502020204030204" pitchFamily="34" charset="0"/>
+                        </a:rPr>
+                        <a:t>Best K = 1 neighbor</a:t>
+                      </a:r>
+                    </a:p>
+                    <a:p>
+                      <a:pPr marL="571500" indent="-571500" algn="l">
+                        <a:buFont typeface="Arial" panose="020B0604020202020204" pitchFamily="34" charset="0"/>
+                        <a:buChar char="•"/>
+                      </a:pPr>
+                      <a:r>
+                        <a:rPr lang="en-US" sz="3200" b="1" dirty="0">
+                          <a:solidFill>
+                            <a:schemeClr val="bg1"/>
+                          </a:solidFill>
+                          <a:latin typeface="Calibri" panose="020F0502020204030204" pitchFamily="34" charset="0"/>
+                          <a:ea typeface="Calibri" panose="020F0502020204030204" pitchFamily="34" charset="0"/>
+                          <a:cs typeface="Calibri" panose="020F0502020204030204" pitchFamily="34" charset="0"/>
+                        </a:rPr>
+                        <a:t>Classification Error: 22.25%</a:t>
+                      </a:r>
                     </a:p>
                     <a:p>
                       <a:endParaRPr lang="en-US" dirty="0"/>
@@ -6916,9 +6962,26 @@
                           <a:ea typeface="Calibri" panose="020F0502020204030204" pitchFamily="34" charset="0"/>
                           <a:cs typeface="Calibri" panose="020F0502020204030204" pitchFamily="34" charset="0"/>
                         </a:rPr>
-                        <a:t>Support Vector Machine</a:t>
+                        <a:t>Random Forest</a:t>
                       </a:r>
-                      <a:endParaRPr lang="en-US" sz="4000" b="0" dirty="0">
+                    </a:p>
+                    <a:p>
+                      <a:pPr algn="l"/>
+                      <a:endParaRPr lang="en-US" sz="3200" b="1" dirty="0">
+                        <a:solidFill>
+                          <a:schemeClr val="bg1"/>
+                        </a:solidFill>
+                        <a:latin typeface="Calibri" panose="020F0502020204030204" pitchFamily="34" charset="0"/>
+                        <a:ea typeface="Calibri" panose="020F0502020204030204" pitchFamily="34" charset="0"/>
+                        <a:cs typeface="Calibri" panose="020F0502020204030204" pitchFamily="34" charset="0"/>
+                      </a:endParaRPr>
+                    </a:p>
+                    <a:p>
+                      <a:pPr marL="571500" indent="-571500" algn="l">
+                        <a:buFont typeface="Arial" panose="020B0604020202020204" pitchFamily="34" charset="0"/>
+                        <a:buChar char="•"/>
+                      </a:pPr>
+                      <a:endParaRPr lang="en-US" sz="3200" b="0" dirty="0">
                         <a:solidFill>
                           <a:schemeClr val="bg1"/>
                         </a:solidFill>
@@ -6941,22 +7004,11 @@
                   </a:ext>
                 </a:extLst>
               </a:tr>
-              <a:tr h="3785270">
+              <a:tr h="2029862">
                 <a:tc>
                   <a:txBody>
                     <a:bodyPr/>
                     <a:lstStyle/>
-                    <a:p>
-                      <a:pPr algn="ctr"/>
-                      <a:endParaRPr lang="en-US" sz="4000" b="1" dirty="0">
-                        <a:solidFill>
-                          <a:schemeClr val="bg1"/>
-                        </a:solidFill>
-                        <a:latin typeface="Calibri" panose="020F0502020204030204" pitchFamily="34" charset="0"/>
-                        <a:ea typeface="Calibri" panose="020F0502020204030204" pitchFamily="34" charset="0"/>
-                        <a:cs typeface="Calibri" panose="020F0502020204030204" pitchFamily="34" charset="0"/>
-                      </a:endParaRPr>
-                    </a:p>
                     <a:p>
                       <a:pPr algn="ctr"/>
                       <a:r>
@@ -6985,7 +7037,7 @@
                         <a:buChar char="•"/>
                       </a:pPr>
                       <a:r>
-                        <a:rPr lang="en-US" sz="4000" b="1" dirty="0">
+                        <a:rPr lang="en-US" sz="2800" b="1" dirty="0">
                           <a:solidFill>
                             <a:schemeClr val="bg1"/>
                           </a:solidFill>
@@ -7002,7 +7054,7 @@
                         <a:buChar char="•"/>
                       </a:pPr>
                       <a:r>
-                        <a:rPr lang="en-US" sz="4000" b="1" dirty="0">
+                        <a:rPr lang="en-US" sz="2800" b="1" dirty="0">
                           <a:solidFill>
                             <a:schemeClr val="bg1"/>
                           </a:solidFill>
@@ -7019,7 +7071,7 @@
                         <a:buChar char="•"/>
                       </a:pPr>
                       <a:r>
-                        <a:rPr lang="en-US" sz="4000" b="1" dirty="0">
+                        <a:rPr lang="en-US" sz="2800" b="1" dirty="0">
                           <a:solidFill>
                             <a:schemeClr val="bg1"/>
                           </a:solidFill>
@@ -7039,13 +7091,6 @@
                   <a:txBody>
                     <a:bodyPr/>
                     <a:lstStyle/>
-                    <a:p>
-                      <a:endParaRPr lang="en-US" sz="4000" dirty="0">
-                        <a:latin typeface="Calibri" panose="020F0502020204030204" pitchFamily="34" charset="0"/>
-                        <a:ea typeface="Calibri" panose="020F0502020204030204" pitchFamily="34" charset="0"/>
-                        <a:cs typeface="Calibri" panose="020F0502020204030204" pitchFamily="34" charset="0"/>
-                      </a:endParaRPr>
-                    </a:p>
                     <a:p>
                       <a:endParaRPr lang="en-US" sz="4000" dirty="0">
                         <a:latin typeface="Calibri" panose="020F0502020204030204" pitchFamily="34" charset="0"/>
@@ -7086,7 +7131,7 @@
                   </a:ext>
                 </a:extLst>
               </a:tr>
-              <a:tr h="8284297">
+              <a:tr h="6839740">
                 <a:tc>
                   <a:txBody>
                     <a:bodyPr/>
@@ -7160,7 +7205,7 @@
                         <a:defRPr/>
                       </a:pPr>
                       <a:r>
-                        <a:rPr kumimoji="0" lang="en-US" sz="4000" b="1" i="0" u="none" strike="noStrike" kern="1200" cap="none" spc="0" normalizeH="0" baseline="0" noProof="0">
+                        <a:rPr kumimoji="0" lang="en-US" sz="3200" b="1" i="0" u="none" strike="noStrike" kern="1200" cap="none" spc="0" normalizeH="0" baseline="0" noProof="0" dirty="0">
                           <a:ln>
                             <a:noFill/>
                           </a:ln>
@@ -7174,24 +7219,7 @@
                           <a:ea typeface="Calibri" panose="020F0502020204030204" pitchFamily="34" charset="0"/>
                           <a:cs typeface="Calibri" panose="020F0502020204030204" pitchFamily="34" charset="0"/>
                         </a:rPr>
-                        <a:t>73 </a:t>
-                      </a:r>
-                      <a:r>
-                        <a:rPr kumimoji="0" lang="en-US" sz="4000" b="1" i="0" u="none" strike="noStrike" kern="1200" cap="none" spc="0" normalizeH="0" baseline="0" noProof="0" dirty="0">
-                          <a:ln>
-                            <a:noFill/>
-                          </a:ln>
-                          <a:solidFill>
-                            <a:srgbClr val="FFFFFF"/>
-                          </a:solidFill>
-                          <a:effectLst/>
-                          <a:uLnTx/>
-                          <a:uFillTx/>
-                          <a:latin typeface="Calibri" panose="020F0502020204030204" pitchFamily="34" charset="0"/>
-                          <a:ea typeface="Calibri" panose="020F0502020204030204" pitchFamily="34" charset="0"/>
-                          <a:cs typeface="Calibri" panose="020F0502020204030204" pitchFamily="34" charset="0"/>
-                        </a:rPr>
-                        <a:t>predictors (1 se)</a:t>
+                        <a:t>73 predictors (1 se)</a:t>
                       </a:r>
                     </a:p>
                     <a:p>
@@ -7213,7 +7241,7 @@
                         <a:defRPr/>
                       </a:pPr>
                       <a:r>
-                        <a:rPr kumimoji="0" lang="en-US" sz="4000" b="1" i="0" u="none" strike="noStrike" kern="1200" cap="none" spc="0" normalizeH="0" baseline="0" noProof="0" dirty="0">
+                        <a:rPr kumimoji="0" lang="en-US" sz="3200" b="1" i="0" u="none" strike="noStrike" kern="1200" cap="none" spc="0" normalizeH="0" baseline="0" noProof="0" dirty="0">
                           <a:ln>
                             <a:noFill/>
                           </a:ln>
@@ -7297,7 +7325,7 @@
                         <a:defRPr/>
                       </a:pPr>
                       <a:r>
-                        <a:rPr kumimoji="0" lang="en-US" sz="4000" b="1" i="0" u="none" strike="noStrike" kern="1200" cap="none" spc="0" normalizeH="0" baseline="0" noProof="0" dirty="0">
+                        <a:rPr kumimoji="0" lang="en-US" sz="3200" b="1" i="0" u="none" strike="noStrike" kern="1200" cap="none" spc="0" normalizeH="0" baseline="0" noProof="0" dirty="0">
                           <a:ln>
                             <a:noFill/>
                           </a:ln>
@@ -7333,7 +7361,7 @@
                         <a:defRPr/>
                       </a:pPr>
                       <a:r>
-                        <a:rPr kumimoji="0" lang="en-US" sz="4000" b="1" i="0" u="none" strike="noStrike" kern="1200" cap="none" spc="0" normalizeH="0" baseline="0" noProof="0" dirty="0">
+                        <a:rPr kumimoji="0" lang="en-US" sz="3200" b="1" i="0" u="none" strike="noStrike" kern="1200" cap="none" spc="0" normalizeH="0" baseline="0" noProof="0" dirty="0">
                           <a:ln>
                             <a:noFill/>
                           </a:ln>
@@ -7387,7 +7415,7 @@
         </p:blipFill>
         <p:spPr>
           <a:xfrm>
-            <a:off x="9266190" y="16008040"/>
+            <a:off x="9194480" y="15983996"/>
             <a:ext cx="7142546" cy="4408712"/>
           </a:xfrm>
           <a:prstGeom prst="rect">
@@ -7417,7 +7445,7 @@
         </p:blipFill>
         <p:spPr>
           <a:xfrm>
-            <a:off x="16697181" y="16008040"/>
+            <a:off x="16841392" y="15983996"/>
             <a:ext cx="7142546" cy="4408712"/>
           </a:xfrm>
           <a:prstGeom prst="rect">
@@ -7449,6 +7477,66 @@
           <a:xfrm>
             <a:off x="30137991" y="19508978"/>
             <a:ext cx="1132223" cy="1141818"/>
+          </a:xfrm>
+          <a:prstGeom prst="rect">
+            <a:avLst/>
+          </a:prstGeom>
+        </p:spPr>
+      </p:pic>
+      <p:pic>
+        <p:nvPicPr>
+          <p:cNvPr id="5" name="Picture 4" descr="Chart, line chart&#10;&#10;Description automatically generated">
+            <a:extLst>
+              <a:ext uri="{FF2B5EF4-FFF2-40B4-BE49-F238E27FC236}">
+                <a16:creationId xmlns:a16="http://schemas.microsoft.com/office/drawing/2014/main" id="{8B881366-6736-3760-49CB-1D012A3CFDA8}"/>
+              </a:ext>
+            </a:extLst>
+          </p:cNvPr>
+          <p:cNvPicPr>
+            <a:picLocks noChangeAspect="1"/>
+          </p:cNvPicPr>
+          <p:nvPr/>
+        </p:nvPicPr>
+        <p:blipFill>
+          <a:blip r:embed="rId8"/>
+          <a:stretch>
+            <a:fillRect/>
+          </a:stretch>
+        </p:blipFill>
+        <p:spPr>
+          <a:xfrm>
+            <a:off x="9408695" y="7815455"/>
+            <a:ext cx="6435038" cy="3932523"/>
+          </a:xfrm>
+          <a:prstGeom prst="rect">
+            <a:avLst/>
+          </a:prstGeom>
+        </p:spPr>
+      </p:pic>
+      <p:pic>
+        <p:nvPicPr>
+          <p:cNvPr id="13" name="Picture 12" descr="Chart, box and whisker chart&#10;&#10;Description automatically generated">
+            <a:extLst>
+              <a:ext uri="{FF2B5EF4-FFF2-40B4-BE49-F238E27FC236}">
+                <a16:creationId xmlns:a16="http://schemas.microsoft.com/office/drawing/2014/main" id="{280B67A6-AFC0-00B2-DF90-374E87602763}"/>
+              </a:ext>
+            </a:extLst>
+          </p:cNvPr>
+          <p:cNvPicPr>
+            <a:picLocks noChangeAspect="1"/>
+          </p:cNvPicPr>
+          <p:nvPr/>
+        </p:nvPicPr>
+        <p:blipFill>
+          <a:blip r:embed="rId9"/>
+          <a:stretch>
+            <a:fillRect/>
+          </a:stretch>
+        </p:blipFill>
+        <p:spPr>
+          <a:xfrm>
+            <a:off x="17399986" y="2064387"/>
+            <a:ext cx="6025358" cy="3434586"/>
           </a:xfrm>
           <a:prstGeom prst="rect">
             <a:avLst/>

</xml_diff>